<commit_message>
some minor changes to presentation
</commit_message>
<xml_diff>
--- a/documents/seminar 2/GDP Group 18 pres.pptx
+++ b/documents/seminar 2/GDP Group 18 pres.pptx
@@ -14858,7 +14858,11 @@
             </a:pPr>
             <a:r>
               <a:rPr lang="en-GB" dirty="0" smtClean="0"/>
-              <a:t>Project management</a:t>
+              <a:t>Project </a:t>
+            </a:r>
+            <a:r>
+              <a:rPr lang="en-GB" dirty="0" smtClean="0"/>
+              <a:t>management</a:t>
             </a:r>
           </a:p>
           <a:p>
@@ -14872,7 +14876,7 @@
             </a:pPr>
             <a:r>
               <a:rPr lang="en-GB" dirty="0" smtClean="0"/>
-              <a:t>Progress</a:t>
+              <a:t>Demo</a:t>
             </a:r>
           </a:p>
           <a:p>
@@ -14885,9 +14889,10 @@
               <a:defRPr/>
             </a:pPr>
             <a:r>
-              <a:rPr lang="en-GB" dirty="0" smtClean="0"/>
-              <a:t>Next Steps</a:t>
-            </a:r>
+              <a:rPr lang="en-GB" smtClean="0"/>
+              <a:t>Questions</a:t>
+            </a:r>
+            <a:endParaRPr lang="en-GB" dirty="0" smtClean="0"/>
           </a:p>
         </p:txBody>
       </p:sp>
@@ -25169,7 +25174,7 @@
                                     <p:cond delay="0"/>
                                   </p:stCondLst>
                                   <p:childTnLst>
-                                    <p:animMotion origin="layout" path="M 0 0 C 0 0.033 0.027 0.06 0.06 0.06 C 0.099 0.06 0.113 0.03 0.119 0.012 L 0.125 -0.012 C 0.131 -0.03 0.146 -0.06 0.19 -0.06 C 0.218 -0.06 0.25 -0.033 0.25 0 C 0.25 0.033 0.218 0.06 0.19 0.06 C 0.146 0.06 0.131 0.03 0.125 0.012 L 0.119 -0.012 C 0.113 -0.03 0.099 -0.06 0.06 -0.06 C 0.027 -0.06 0 -0.033 0 0 Z" pathEditMode="relative" ptsTypes="">
+                                    <p:animMotion origin="layout" path="M 1.94444E-6 0 C 1.94444E-6 0.0331 0.02656 0.05995 0.05885 0.05995 C 0.09687 0.05995 0.11059 0.03009 0.11632 0.01204 L 0.12222 -0.01204 C 0.1283 -0.03009 0.14271 -0.05995 0.18559 -0.05995 C 0.21302 -0.05995 0.24444 -0.0331 0.24444 0 C 0.24444 0.0331 0.21302 0.05995 0.18559 0.05995 C 0.14271 0.05995 0.1283 0.03009 0.12222 0.01204 L 0.11632 -0.01204 C 0.11059 -0.03009 0.09687 -0.05995 0.05885 -0.05995 C 0.02656 -0.05995 1.94444E-6 -0.0331 1.94444E-6 0 Z " pathEditMode="relative" rAng="0" ptsTypes="ffFffffFfff">
                                       <p:cBhvr>
                                         <p:cTn id="6" dur="2000" fill="hold"/>
                                         <p:tgtEl>
@@ -25180,6 +25185,7 @@
                                           <p:attrName>ppt_y</p:attrName>
                                         </p:attrNameLst>
                                       </p:cBhvr>
+                                      <p:rCtr x="12222" y="0"/>
                                     </p:animMotion>
                                   </p:childTnLst>
                                 </p:cTn>
@@ -25476,22 +25482,14 @@
             <a:pPr eaLnBrk="1" hangingPunct="1"/>
             <a:r>
               <a:rPr lang="en-GB" dirty="0" smtClean="0"/>
-              <a:t>Progressive </a:t>
-            </a:r>
+              <a:t>Progressive Image encoding/decoding</a:t>
+            </a:r>
+          </a:p>
+          <a:p>
+            <a:pPr eaLnBrk="1" hangingPunct="1"/>
             <a:r>
               <a:rPr lang="en-GB" dirty="0" smtClean="0"/>
-              <a:t>Image encoding/decoding</a:t>
-            </a:r>
-          </a:p>
-          <a:p>
-            <a:pPr eaLnBrk="1" hangingPunct="1"/>
-            <a:r>
-              <a:rPr lang="en-GB" dirty="0" smtClean="0"/>
-              <a:t>Minimise download time (less than 3 minutes</a:t>
-            </a:r>
-            <a:r>
-              <a:rPr lang="en-GB" dirty="0" smtClean="0"/>
-              <a:t>)</a:t>
+              <a:t>Minimise download time (less than 3 minutes)</a:t>
             </a:r>
             <a:endParaRPr lang="en-GB" dirty="0"/>
           </a:p>

</xml_diff>